<commit_message>
add in pdf versions of slides, for easier display in github
</commit_message>
<xml_diff>
--- a/presentations/neural-networks.pptx
+++ b/presentations/neural-networks.pptx
@@ -12886,11 +12886,18 @@
               <a:t>Neural Networks</a:t>
             </a:r>
             <a:br>
-              <a:rPr lang="en-US" sz="2800" dirty="0"/>
+              <a:rPr lang="en-US" sz="2800"/>
+            </a:br>
+            <a:br>
+              <a:rPr lang="en-US" sz="2800"/>
             </a:br>
             <a:r>
+              <a:rPr lang="en-US" sz="2800"/>
+              <a:t>BHI </a:t>
+            </a:r>
+            <a:r>
               <a:rPr lang="en-US" sz="2800" dirty="0"/>
-              <a:t>BHI Youth Awards</a:t>
+              <a:t>Youth Awards</a:t>
             </a:r>
             <a:endParaRPr lang="en-US" sz="2800" b="1" dirty="0">
               <a:latin typeface="Calibri" panose="020F0502020204030204" pitchFamily="34" charset="0"/>
@@ -26233,6 +26240,21 @@
 </file>
 
 <file path=customXml/item1.xml><?xml version="1.0" encoding="utf-8"?>
+<p:properties xmlns:p="http://schemas.microsoft.com/office/2006/metadata/properties" xmlns:xsi="http://www.w3.org/2001/XMLSchema-instance" xmlns:pc="http://schemas.microsoft.com/office/infopath/2007/PartnerControls">
+  <documentManagement/>
+</p:properties>
+</file>
+
+<file path=customXml/item2.xml><?xml version="1.0" encoding="utf-8"?>
+<?mso-contentType ?>
+<FormTemplates xmlns="http://schemas.microsoft.com/sharepoint/v3/contenttype/forms">
+  <Display>DocumentLibraryForm</Display>
+  <Edit>DocumentLibraryForm</Edit>
+  <New>DocumentLibraryForm</New>
+</FormTemplates>
+</file>
+
+<file path=customXml/item3.xml><?xml version="1.0" encoding="utf-8"?>
 <ct:contentTypeSchema xmlns:ct="http://schemas.microsoft.com/office/2006/metadata/contentType" xmlns:ma="http://schemas.microsoft.com/office/2006/metadata/properties/metaAttributes" ct:_="" ma:_="" ma:contentTypeName="Document" ma:contentTypeID="0x010100B02558F287BC8344AD539CDC4DA17FBC" ma:contentTypeVersion="10" ma:contentTypeDescription="Create a new document." ma:contentTypeScope="" ma:versionID="165e8038d85e89d0753c71c915416bd7">
   <xsd:schema xmlns:xsd="http://www.w3.org/2001/XMLSchema" xmlns:xs="http://www.w3.org/2001/XMLSchema" xmlns:p="http://schemas.microsoft.com/office/2006/metadata/properties" xmlns:ns2="a9a9e2ba-2d19-46fe-bf54-0255447a607c" xmlns:ns3="8e67869f-b319-4f8e-812d-d2b9322169ce" targetNamespace="http://schemas.microsoft.com/office/2006/metadata/properties" ma:root="true" ma:fieldsID="abf99e3026b4072fe3426938b59b700a" ns2:_="" ns3:_="">
     <xsd:import namespace="a9a9e2ba-2d19-46fe-bf54-0255447a607c"/>
@@ -26437,22 +26459,32 @@
 </ct:contentTypeSchema>
 </file>
 
-<file path=customXml/item2.xml><?xml version="1.0" encoding="utf-8"?>
-<?mso-contentType ?>
-<FormTemplates xmlns="http://schemas.microsoft.com/sharepoint/v3/contenttype/forms">
-  <Display>DocumentLibraryForm</Display>
-  <Edit>DocumentLibraryForm</Edit>
-  <New>DocumentLibraryForm</New>
-</FormTemplates>
+<file path=customXml/itemProps1.xml><?xml version="1.0" encoding="utf-8"?>
+<ds:datastoreItem xmlns:ds="http://schemas.openxmlformats.org/officeDocument/2006/customXml" ds:itemID="{D1B4FFAB-A2D9-4FD5-855F-F65126373F7D}">
+  <ds:schemaRefs>
+    <ds:schemaRef ds:uri="http://schemas.openxmlformats.org/package/2006/metadata/core-properties"/>
+    <ds:schemaRef ds:uri="http://schemas.microsoft.com/office/2006/documentManagement/types"/>
+    <ds:schemaRef ds:uri="http://schemas.microsoft.com/office/infopath/2007/PartnerControls"/>
+    <ds:schemaRef ds:uri="http://purl.org/dc/elements/1.1/"/>
+    <ds:schemaRef ds:uri="http://schemas.microsoft.com/office/2006/metadata/properties"/>
+    <ds:schemaRef ds:uri="8e67869f-b319-4f8e-812d-d2b9322169ce"/>
+    <ds:schemaRef ds:uri="http://purl.org/dc/terms/"/>
+    <ds:schemaRef ds:uri="a9a9e2ba-2d19-46fe-bf54-0255447a607c"/>
+    <ds:schemaRef ds:uri="http://www.w3.org/XML/1998/namespace"/>
+    <ds:schemaRef ds:uri="http://purl.org/dc/dcmitype/"/>
+  </ds:schemaRefs>
+</ds:datastoreItem>
 </file>
 
-<file path=customXml/item3.xml><?xml version="1.0" encoding="utf-8"?>
-<p:properties xmlns:p="http://schemas.microsoft.com/office/2006/metadata/properties" xmlns:xsi="http://www.w3.org/2001/XMLSchema-instance" xmlns:pc="http://schemas.microsoft.com/office/infopath/2007/PartnerControls">
-  <documentManagement/>
-</p:properties>
+<file path=customXml/itemProps2.xml><?xml version="1.0" encoding="utf-8"?>
+<ds:datastoreItem xmlns:ds="http://schemas.openxmlformats.org/officeDocument/2006/customXml" ds:itemID="{4A9C8777-C6EC-4528-A529-B1E15BCDF7A3}">
+  <ds:schemaRefs>
+    <ds:schemaRef ds:uri="http://schemas.microsoft.com/sharepoint/v3/contenttype/forms"/>
+  </ds:schemaRefs>
+</ds:datastoreItem>
 </file>
 
-<file path=customXml/itemProps1.xml><?xml version="1.0" encoding="utf-8"?>
+<file path=customXml/itemProps3.xml><?xml version="1.0" encoding="utf-8"?>
 <ds:datastoreItem xmlns:ds="http://schemas.openxmlformats.org/officeDocument/2006/customXml" ds:itemID="{91B57E6C-04A0-4EB4-9DC4-971645A5D1A1}">
   <ds:schemaRefs>
     <ds:schemaRef ds:uri="http://schemas.microsoft.com/office/2006/metadata/contentType"/>
@@ -26469,29 +26501,4 @@
     <ds:schemaRef ds:uri="http://schemas.microsoft.com/internal/obd"/>
   </ds:schemaRefs>
 </ds:datastoreItem>
-</file>
-
-<file path=customXml/itemProps2.xml><?xml version="1.0" encoding="utf-8"?>
-<ds:datastoreItem xmlns:ds="http://schemas.openxmlformats.org/officeDocument/2006/customXml" ds:itemID="{4A9C8777-C6EC-4528-A529-B1E15BCDF7A3}">
-  <ds:schemaRefs>
-    <ds:schemaRef ds:uri="http://schemas.microsoft.com/sharepoint/v3/contenttype/forms"/>
-  </ds:schemaRefs>
-</ds:datastoreItem>
-</file>
-
-<file path=customXml/itemProps3.xml><?xml version="1.0" encoding="utf-8"?>
-<ds:datastoreItem xmlns:ds="http://schemas.openxmlformats.org/officeDocument/2006/customXml" ds:itemID="{D1B4FFAB-A2D9-4FD5-855F-F65126373F7D}">
-  <ds:schemaRefs>
-    <ds:schemaRef ds:uri="http://schemas.openxmlformats.org/package/2006/metadata/core-properties"/>
-    <ds:schemaRef ds:uri="http://schemas.microsoft.com/office/2006/documentManagement/types"/>
-    <ds:schemaRef ds:uri="http://schemas.microsoft.com/office/infopath/2007/PartnerControls"/>
-    <ds:schemaRef ds:uri="http://purl.org/dc/elements/1.1/"/>
-    <ds:schemaRef ds:uri="http://schemas.microsoft.com/office/2006/metadata/properties"/>
-    <ds:schemaRef ds:uri="8e67869f-b319-4f8e-812d-d2b9322169ce"/>
-    <ds:schemaRef ds:uri="http://purl.org/dc/terms/"/>
-    <ds:schemaRef ds:uri="a9a9e2ba-2d19-46fe-bf54-0255447a607c"/>
-    <ds:schemaRef ds:uri="http://www.w3.org/XML/1998/namespace"/>
-    <ds:schemaRef ds:uri="http://purl.org/dc/dcmitype/"/>
-  </ds:schemaRefs>
-</ds:datastoreItem>
 </file>
</xml_diff>